<commit_message>
split strtegy and uniform pwm
</commit_message>
<xml_diff>
--- a/ppt/for_split.pptx
+++ b/ppt/for_split.pptx
@@ -104,6 +104,11 @@
       </a:defRPr>
     </a:lvl9pPr>
   </p:defaultTextStyle>
+  <p:extLst>
+    <p:ext uri="{EFAFB233-063F-42B5-8137-9DF3F51BA10A}">
+      <p15:sldGuideLst xmlns:p15="http://schemas.microsoft.com/office/powerpoint/2012/main"/>
+    </p:ext>
+  </p:extLst>
 </p:presentation>
 </file>
 
@@ -129,7 +134,7 @@
           <p:cNvPr id="2" name="標題 1">
             <a:extLst>
               <a:ext uri="{FF2B5EF4-FFF2-40B4-BE49-F238E27FC236}">
-                <a16:creationId xmlns:a16="http://schemas.microsoft.com/office/drawing/2014/main" id="{4D174AAB-324E-9227-0E41-64A0B31960AB}"/>
+                <a16:creationId xmlns:a16="http://schemas.microsoft.com/office/drawing/2014/main" xmlns="" id="{4D174AAB-324E-9227-0E41-64A0B31960AB}"/>
               </a:ext>
             </a:extLst>
           </p:cNvPr>
@@ -166,7 +171,7 @@
           <p:cNvPr id="3" name="副標題 2">
             <a:extLst>
               <a:ext uri="{FF2B5EF4-FFF2-40B4-BE49-F238E27FC236}">
-                <a16:creationId xmlns:a16="http://schemas.microsoft.com/office/drawing/2014/main" id="{57C6BC87-B6B9-4A84-B490-05D1E588C532}"/>
+                <a16:creationId xmlns:a16="http://schemas.microsoft.com/office/drawing/2014/main" xmlns="" id="{57C6BC87-B6B9-4A84-B490-05D1E588C532}"/>
               </a:ext>
             </a:extLst>
           </p:cNvPr>
@@ -236,7 +241,7 @@
           <p:cNvPr id="4" name="日期版面配置區 3">
             <a:extLst>
               <a:ext uri="{FF2B5EF4-FFF2-40B4-BE49-F238E27FC236}">
-                <a16:creationId xmlns:a16="http://schemas.microsoft.com/office/drawing/2014/main" id="{01B69329-F333-B4A8-9286-44A1A41D111D}"/>
+                <a16:creationId xmlns:a16="http://schemas.microsoft.com/office/drawing/2014/main" xmlns="" id="{01B69329-F333-B4A8-9286-44A1A41D111D}"/>
               </a:ext>
             </a:extLst>
           </p:cNvPr>
@@ -265,7 +270,7 @@
           <p:cNvPr id="5" name="頁尾版面配置區 4">
             <a:extLst>
               <a:ext uri="{FF2B5EF4-FFF2-40B4-BE49-F238E27FC236}">
-                <a16:creationId xmlns:a16="http://schemas.microsoft.com/office/drawing/2014/main" id="{D0546FD6-3F0A-C884-339B-A5C4992F063B}"/>
+                <a16:creationId xmlns:a16="http://schemas.microsoft.com/office/drawing/2014/main" xmlns="" id="{D0546FD6-3F0A-C884-339B-A5C4992F063B}"/>
               </a:ext>
             </a:extLst>
           </p:cNvPr>
@@ -290,7 +295,7 @@
           <p:cNvPr id="6" name="投影片編號版面配置區 5">
             <a:extLst>
               <a:ext uri="{FF2B5EF4-FFF2-40B4-BE49-F238E27FC236}">
-                <a16:creationId xmlns:a16="http://schemas.microsoft.com/office/drawing/2014/main" id="{9B2D563A-DAE0-C790-9557-4DC05AB28460}"/>
+                <a16:creationId xmlns:a16="http://schemas.microsoft.com/office/drawing/2014/main" xmlns="" id="{9B2D563A-DAE0-C790-9557-4DC05AB28460}"/>
               </a:ext>
             </a:extLst>
           </p:cNvPr>
@@ -349,7 +354,7 @@
           <p:cNvPr id="2" name="標題 1">
             <a:extLst>
               <a:ext uri="{FF2B5EF4-FFF2-40B4-BE49-F238E27FC236}">
-                <a16:creationId xmlns:a16="http://schemas.microsoft.com/office/drawing/2014/main" id="{AF6A6B82-1D9B-8ECA-91AD-356C633A01B6}"/>
+                <a16:creationId xmlns:a16="http://schemas.microsoft.com/office/drawing/2014/main" xmlns="" id="{AF6A6B82-1D9B-8ECA-91AD-356C633A01B6}"/>
               </a:ext>
             </a:extLst>
           </p:cNvPr>
@@ -377,7 +382,7 @@
           <p:cNvPr id="3" name="直排文字版面配置區 2">
             <a:extLst>
               <a:ext uri="{FF2B5EF4-FFF2-40B4-BE49-F238E27FC236}">
-                <a16:creationId xmlns:a16="http://schemas.microsoft.com/office/drawing/2014/main" id="{A4D679B6-8162-800B-0A11-C591CE77901A}"/>
+                <a16:creationId xmlns:a16="http://schemas.microsoft.com/office/drawing/2014/main" xmlns="" id="{A4D679B6-8162-800B-0A11-C591CE77901A}"/>
               </a:ext>
             </a:extLst>
           </p:cNvPr>
@@ -434,7 +439,7 @@
           <p:cNvPr id="4" name="日期版面配置區 3">
             <a:extLst>
               <a:ext uri="{FF2B5EF4-FFF2-40B4-BE49-F238E27FC236}">
-                <a16:creationId xmlns:a16="http://schemas.microsoft.com/office/drawing/2014/main" id="{99F3B314-F05A-CBFF-4EDF-D41F885318FE}"/>
+                <a16:creationId xmlns:a16="http://schemas.microsoft.com/office/drawing/2014/main" xmlns="" id="{99F3B314-F05A-CBFF-4EDF-D41F885318FE}"/>
               </a:ext>
             </a:extLst>
           </p:cNvPr>
@@ -463,7 +468,7 @@
           <p:cNvPr id="5" name="頁尾版面配置區 4">
             <a:extLst>
               <a:ext uri="{FF2B5EF4-FFF2-40B4-BE49-F238E27FC236}">
-                <a16:creationId xmlns:a16="http://schemas.microsoft.com/office/drawing/2014/main" id="{3C17AD88-09B9-D8F3-23DA-916E07D8B946}"/>
+                <a16:creationId xmlns:a16="http://schemas.microsoft.com/office/drawing/2014/main" xmlns="" id="{3C17AD88-09B9-D8F3-23DA-916E07D8B946}"/>
               </a:ext>
             </a:extLst>
           </p:cNvPr>
@@ -488,7 +493,7 @@
           <p:cNvPr id="6" name="投影片編號版面配置區 5">
             <a:extLst>
               <a:ext uri="{FF2B5EF4-FFF2-40B4-BE49-F238E27FC236}">
-                <a16:creationId xmlns:a16="http://schemas.microsoft.com/office/drawing/2014/main" id="{5C098BFE-B046-8EAF-40FB-B6399E86067F}"/>
+                <a16:creationId xmlns:a16="http://schemas.microsoft.com/office/drawing/2014/main" xmlns="" id="{5C098BFE-B046-8EAF-40FB-B6399E86067F}"/>
               </a:ext>
             </a:extLst>
           </p:cNvPr>
@@ -547,7 +552,7 @@
           <p:cNvPr id="2" name="直排標題 1">
             <a:extLst>
               <a:ext uri="{FF2B5EF4-FFF2-40B4-BE49-F238E27FC236}">
-                <a16:creationId xmlns:a16="http://schemas.microsoft.com/office/drawing/2014/main" id="{DB6D05ED-07B8-CD2E-3632-0A40BBFD3756}"/>
+                <a16:creationId xmlns:a16="http://schemas.microsoft.com/office/drawing/2014/main" xmlns="" id="{DB6D05ED-07B8-CD2E-3632-0A40BBFD3756}"/>
               </a:ext>
             </a:extLst>
           </p:cNvPr>
@@ -580,7 +585,7 @@
           <p:cNvPr id="3" name="直排文字版面配置區 2">
             <a:extLst>
               <a:ext uri="{FF2B5EF4-FFF2-40B4-BE49-F238E27FC236}">
-                <a16:creationId xmlns:a16="http://schemas.microsoft.com/office/drawing/2014/main" id="{882E08F8-C2C9-0189-01CF-B1103D166608}"/>
+                <a16:creationId xmlns:a16="http://schemas.microsoft.com/office/drawing/2014/main" xmlns="" id="{882E08F8-C2C9-0189-01CF-B1103D166608}"/>
               </a:ext>
             </a:extLst>
           </p:cNvPr>
@@ -642,7 +647,7 @@
           <p:cNvPr id="4" name="日期版面配置區 3">
             <a:extLst>
               <a:ext uri="{FF2B5EF4-FFF2-40B4-BE49-F238E27FC236}">
-                <a16:creationId xmlns:a16="http://schemas.microsoft.com/office/drawing/2014/main" id="{381DB6FB-FC9C-E69B-93C7-A4D08137B46C}"/>
+                <a16:creationId xmlns:a16="http://schemas.microsoft.com/office/drawing/2014/main" xmlns="" id="{381DB6FB-FC9C-E69B-93C7-A4D08137B46C}"/>
               </a:ext>
             </a:extLst>
           </p:cNvPr>
@@ -671,7 +676,7 @@
           <p:cNvPr id="5" name="頁尾版面配置區 4">
             <a:extLst>
               <a:ext uri="{FF2B5EF4-FFF2-40B4-BE49-F238E27FC236}">
-                <a16:creationId xmlns:a16="http://schemas.microsoft.com/office/drawing/2014/main" id="{EA08E61F-AE85-46D9-3C74-BBE356D33020}"/>
+                <a16:creationId xmlns:a16="http://schemas.microsoft.com/office/drawing/2014/main" xmlns="" id="{EA08E61F-AE85-46D9-3C74-BBE356D33020}"/>
               </a:ext>
             </a:extLst>
           </p:cNvPr>
@@ -696,7 +701,7 @@
           <p:cNvPr id="6" name="投影片編號版面配置區 5">
             <a:extLst>
               <a:ext uri="{FF2B5EF4-FFF2-40B4-BE49-F238E27FC236}">
-                <a16:creationId xmlns:a16="http://schemas.microsoft.com/office/drawing/2014/main" id="{91D3D7C0-E9CF-7D7C-27A6-FB11B0D9D388}"/>
+                <a16:creationId xmlns:a16="http://schemas.microsoft.com/office/drawing/2014/main" xmlns="" id="{91D3D7C0-E9CF-7D7C-27A6-FB11B0D9D388}"/>
               </a:ext>
             </a:extLst>
           </p:cNvPr>
@@ -755,7 +760,7 @@
           <p:cNvPr id="2" name="標題 1">
             <a:extLst>
               <a:ext uri="{FF2B5EF4-FFF2-40B4-BE49-F238E27FC236}">
-                <a16:creationId xmlns:a16="http://schemas.microsoft.com/office/drawing/2014/main" id="{09834061-49AC-C420-A624-944C540BFB32}"/>
+                <a16:creationId xmlns:a16="http://schemas.microsoft.com/office/drawing/2014/main" xmlns="" id="{09834061-49AC-C420-A624-944C540BFB32}"/>
               </a:ext>
             </a:extLst>
           </p:cNvPr>
@@ -783,7 +788,7 @@
           <p:cNvPr id="3" name="內容版面配置區 2">
             <a:extLst>
               <a:ext uri="{FF2B5EF4-FFF2-40B4-BE49-F238E27FC236}">
-                <a16:creationId xmlns:a16="http://schemas.microsoft.com/office/drawing/2014/main" id="{F5566321-23C5-28A7-3860-AEDA21116294}"/>
+                <a16:creationId xmlns:a16="http://schemas.microsoft.com/office/drawing/2014/main" xmlns="" id="{F5566321-23C5-28A7-3860-AEDA21116294}"/>
               </a:ext>
             </a:extLst>
           </p:cNvPr>
@@ -840,7 +845,7 @@
           <p:cNvPr id="4" name="日期版面配置區 3">
             <a:extLst>
               <a:ext uri="{FF2B5EF4-FFF2-40B4-BE49-F238E27FC236}">
-                <a16:creationId xmlns:a16="http://schemas.microsoft.com/office/drawing/2014/main" id="{C8520DE8-A352-7D76-8E49-2337BE326774}"/>
+                <a16:creationId xmlns:a16="http://schemas.microsoft.com/office/drawing/2014/main" xmlns="" id="{C8520DE8-A352-7D76-8E49-2337BE326774}"/>
               </a:ext>
             </a:extLst>
           </p:cNvPr>
@@ -869,7 +874,7 @@
           <p:cNvPr id="5" name="頁尾版面配置區 4">
             <a:extLst>
               <a:ext uri="{FF2B5EF4-FFF2-40B4-BE49-F238E27FC236}">
-                <a16:creationId xmlns:a16="http://schemas.microsoft.com/office/drawing/2014/main" id="{DFC500CD-A09B-0518-D948-3FE64F6D4BE5}"/>
+                <a16:creationId xmlns:a16="http://schemas.microsoft.com/office/drawing/2014/main" xmlns="" id="{DFC500CD-A09B-0518-D948-3FE64F6D4BE5}"/>
               </a:ext>
             </a:extLst>
           </p:cNvPr>
@@ -894,7 +899,7 @@
           <p:cNvPr id="6" name="投影片編號版面配置區 5">
             <a:extLst>
               <a:ext uri="{FF2B5EF4-FFF2-40B4-BE49-F238E27FC236}">
-                <a16:creationId xmlns:a16="http://schemas.microsoft.com/office/drawing/2014/main" id="{F147C665-00F7-9222-F2E8-CD8FF4FB5820}"/>
+                <a16:creationId xmlns:a16="http://schemas.microsoft.com/office/drawing/2014/main" xmlns="" id="{F147C665-00F7-9222-F2E8-CD8FF4FB5820}"/>
               </a:ext>
             </a:extLst>
           </p:cNvPr>
@@ -953,7 +958,7 @@
           <p:cNvPr id="2" name="標題 1">
             <a:extLst>
               <a:ext uri="{FF2B5EF4-FFF2-40B4-BE49-F238E27FC236}">
-                <a16:creationId xmlns:a16="http://schemas.microsoft.com/office/drawing/2014/main" id="{D31E564A-1841-8423-0B20-12BBDD67D10E}"/>
+                <a16:creationId xmlns:a16="http://schemas.microsoft.com/office/drawing/2014/main" xmlns="" id="{D31E564A-1841-8423-0B20-12BBDD67D10E}"/>
               </a:ext>
             </a:extLst>
           </p:cNvPr>
@@ -990,7 +995,7 @@
           <p:cNvPr id="3" name="文字版面配置區 2">
             <a:extLst>
               <a:ext uri="{FF2B5EF4-FFF2-40B4-BE49-F238E27FC236}">
-                <a16:creationId xmlns:a16="http://schemas.microsoft.com/office/drawing/2014/main" id="{15FCD756-016E-4663-B1BF-AE50240DD8FB}"/>
+                <a16:creationId xmlns:a16="http://schemas.microsoft.com/office/drawing/2014/main" xmlns="" id="{15FCD756-016E-4663-B1BF-AE50240DD8FB}"/>
               </a:ext>
             </a:extLst>
           </p:cNvPr>
@@ -1115,7 +1120,7 @@
           <p:cNvPr id="4" name="日期版面配置區 3">
             <a:extLst>
               <a:ext uri="{FF2B5EF4-FFF2-40B4-BE49-F238E27FC236}">
-                <a16:creationId xmlns:a16="http://schemas.microsoft.com/office/drawing/2014/main" id="{BC8DB5EB-6AC9-5A51-6CAB-53768BC59D65}"/>
+                <a16:creationId xmlns:a16="http://schemas.microsoft.com/office/drawing/2014/main" xmlns="" id="{BC8DB5EB-6AC9-5A51-6CAB-53768BC59D65}"/>
               </a:ext>
             </a:extLst>
           </p:cNvPr>
@@ -1144,7 +1149,7 @@
           <p:cNvPr id="5" name="頁尾版面配置區 4">
             <a:extLst>
               <a:ext uri="{FF2B5EF4-FFF2-40B4-BE49-F238E27FC236}">
-                <a16:creationId xmlns:a16="http://schemas.microsoft.com/office/drawing/2014/main" id="{0BD17EC9-AA30-6237-C94A-9EA4AA4EEA9F}"/>
+                <a16:creationId xmlns:a16="http://schemas.microsoft.com/office/drawing/2014/main" xmlns="" id="{0BD17EC9-AA30-6237-C94A-9EA4AA4EEA9F}"/>
               </a:ext>
             </a:extLst>
           </p:cNvPr>
@@ -1169,7 +1174,7 @@
           <p:cNvPr id="6" name="投影片編號版面配置區 5">
             <a:extLst>
               <a:ext uri="{FF2B5EF4-FFF2-40B4-BE49-F238E27FC236}">
-                <a16:creationId xmlns:a16="http://schemas.microsoft.com/office/drawing/2014/main" id="{6061B127-61AB-CACA-9AC6-AB51C29EEC39}"/>
+                <a16:creationId xmlns:a16="http://schemas.microsoft.com/office/drawing/2014/main" xmlns="" id="{6061B127-61AB-CACA-9AC6-AB51C29EEC39}"/>
               </a:ext>
             </a:extLst>
           </p:cNvPr>
@@ -1228,7 +1233,7 @@
           <p:cNvPr id="2" name="標題 1">
             <a:extLst>
               <a:ext uri="{FF2B5EF4-FFF2-40B4-BE49-F238E27FC236}">
-                <a16:creationId xmlns:a16="http://schemas.microsoft.com/office/drawing/2014/main" id="{518BCACA-4A86-D65B-A891-F3DF27CE6082}"/>
+                <a16:creationId xmlns:a16="http://schemas.microsoft.com/office/drawing/2014/main" xmlns="" id="{518BCACA-4A86-D65B-A891-F3DF27CE6082}"/>
               </a:ext>
             </a:extLst>
           </p:cNvPr>
@@ -1256,7 +1261,7 @@
           <p:cNvPr id="3" name="內容版面配置區 2">
             <a:extLst>
               <a:ext uri="{FF2B5EF4-FFF2-40B4-BE49-F238E27FC236}">
-                <a16:creationId xmlns:a16="http://schemas.microsoft.com/office/drawing/2014/main" id="{B880A87E-D7EC-61D8-65AD-9134E3D66797}"/>
+                <a16:creationId xmlns:a16="http://schemas.microsoft.com/office/drawing/2014/main" xmlns="" id="{B880A87E-D7EC-61D8-65AD-9134E3D66797}"/>
               </a:ext>
             </a:extLst>
           </p:cNvPr>
@@ -1318,7 +1323,7 @@
           <p:cNvPr id="4" name="內容版面配置區 3">
             <a:extLst>
               <a:ext uri="{FF2B5EF4-FFF2-40B4-BE49-F238E27FC236}">
-                <a16:creationId xmlns:a16="http://schemas.microsoft.com/office/drawing/2014/main" id="{256BF494-E420-A06B-F0B8-1D303891C182}"/>
+                <a16:creationId xmlns:a16="http://schemas.microsoft.com/office/drawing/2014/main" xmlns="" id="{256BF494-E420-A06B-F0B8-1D303891C182}"/>
               </a:ext>
             </a:extLst>
           </p:cNvPr>
@@ -1380,7 +1385,7 @@
           <p:cNvPr id="5" name="日期版面配置區 4">
             <a:extLst>
               <a:ext uri="{FF2B5EF4-FFF2-40B4-BE49-F238E27FC236}">
-                <a16:creationId xmlns:a16="http://schemas.microsoft.com/office/drawing/2014/main" id="{7F7DABBA-E5CE-FAF9-0E0E-E47D025BB806}"/>
+                <a16:creationId xmlns:a16="http://schemas.microsoft.com/office/drawing/2014/main" xmlns="" id="{7F7DABBA-E5CE-FAF9-0E0E-E47D025BB806}"/>
               </a:ext>
             </a:extLst>
           </p:cNvPr>
@@ -1409,7 +1414,7 @@
           <p:cNvPr id="6" name="頁尾版面配置區 5">
             <a:extLst>
               <a:ext uri="{FF2B5EF4-FFF2-40B4-BE49-F238E27FC236}">
-                <a16:creationId xmlns:a16="http://schemas.microsoft.com/office/drawing/2014/main" id="{AD9B8038-E1C1-4C91-0D0D-049CFC32432B}"/>
+                <a16:creationId xmlns:a16="http://schemas.microsoft.com/office/drawing/2014/main" xmlns="" id="{AD9B8038-E1C1-4C91-0D0D-049CFC32432B}"/>
               </a:ext>
             </a:extLst>
           </p:cNvPr>
@@ -1434,7 +1439,7 @@
           <p:cNvPr id="7" name="投影片編號版面配置區 6">
             <a:extLst>
               <a:ext uri="{FF2B5EF4-FFF2-40B4-BE49-F238E27FC236}">
-                <a16:creationId xmlns:a16="http://schemas.microsoft.com/office/drawing/2014/main" id="{BEEDF0EA-8F32-4EBD-6CCA-0A3E9F3A40A7}"/>
+                <a16:creationId xmlns:a16="http://schemas.microsoft.com/office/drawing/2014/main" xmlns="" id="{BEEDF0EA-8F32-4EBD-6CCA-0A3E9F3A40A7}"/>
               </a:ext>
             </a:extLst>
           </p:cNvPr>
@@ -1493,7 +1498,7 @@
           <p:cNvPr id="2" name="標題 1">
             <a:extLst>
               <a:ext uri="{FF2B5EF4-FFF2-40B4-BE49-F238E27FC236}">
-                <a16:creationId xmlns:a16="http://schemas.microsoft.com/office/drawing/2014/main" id="{D7417185-8E53-368D-D537-A4A91B1C3D70}"/>
+                <a16:creationId xmlns:a16="http://schemas.microsoft.com/office/drawing/2014/main" xmlns="" id="{D7417185-8E53-368D-D537-A4A91B1C3D70}"/>
               </a:ext>
             </a:extLst>
           </p:cNvPr>
@@ -1526,7 +1531,7 @@
           <p:cNvPr id="3" name="文字版面配置區 2">
             <a:extLst>
               <a:ext uri="{FF2B5EF4-FFF2-40B4-BE49-F238E27FC236}">
-                <a16:creationId xmlns:a16="http://schemas.microsoft.com/office/drawing/2014/main" id="{6832BB07-DA97-D762-04B3-A1352292B95E}"/>
+                <a16:creationId xmlns:a16="http://schemas.microsoft.com/office/drawing/2014/main" xmlns="" id="{6832BB07-DA97-D762-04B3-A1352292B95E}"/>
               </a:ext>
             </a:extLst>
           </p:cNvPr>
@@ -1597,7 +1602,7 @@
           <p:cNvPr id="4" name="內容版面配置區 3">
             <a:extLst>
               <a:ext uri="{FF2B5EF4-FFF2-40B4-BE49-F238E27FC236}">
-                <a16:creationId xmlns:a16="http://schemas.microsoft.com/office/drawing/2014/main" id="{4CECA1C3-49AB-5E95-5C1A-58C1C23BBEB5}"/>
+                <a16:creationId xmlns:a16="http://schemas.microsoft.com/office/drawing/2014/main" xmlns="" id="{4CECA1C3-49AB-5E95-5C1A-58C1C23BBEB5}"/>
               </a:ext>
             </a:extLst>
           </p:cNvPr>
@@ -1659,7 +1664,7 @@
           <p:cNvPr id="5" name="文字版面配置區 4">
             <a:extLst>
               <a:ext uri="{FF2B5EF4-FFF2-40B4-BE49-F238E27FC236}">
-                <a16:creationId xmlns:a16="http://schemas.microsoft.com/office/drawing/2014/main" id="{C1AFCF6C-C4B7-5C0D-4218-2AEE19BBEE37}"/>
+                <a16:creationId xmlns:a16="http://schemas.microsoft.com/office/drawing/2014/main" xmlns="" id="{C1AFCF6C-C4B7-5C0D-4218-2AEE19BBEE37}"/>
               </a:ext>
             </a:extLst>
           </p:cNvPr>
@@ -1730,7 +1735,7 @@
           <p:cNvPr id="6" name="內容版面配置區 5">
             <a:extLst>
               <a:ext uri="{FF2B5EF4-FFF2-40B4-BE49-F238E27FC236}">
-                <a16:creationId xmlns:a16="http://schemas.microsoft.com/office/drawing/2014/main" id="{99B148C2-1110-3F6A-895A-20012DFE6742}"/>
+                <a16:creationId xmlns:a16="http://schemas.microsoft.com/office/drawing/2014/main" xmlns="" id="{99B148C2-1110-3F6A-895A-20012DFE6742}"/>
               </a:ext>
             </a:extLst>
           </p:cNvPr>
@@ -1792,7 +1797,7 @@
           <p:cNvPr id="7" name="日期版面配置區 6">
             <a:extLst>
               <a:ext uri="{FF2B5EF4-FFF2-40B4-BE49-F238E27FC236}">
-                <a16:creationId xmlns:a16="http://schemas.microsoft.com/office/drawing/2014/main" id="{2B3BC7D9-408D-70DD-C133-F3754E102C5E}"/>
+                <a16:creationId xmlns:a16="http://schemas.microsoft.com/office/drawing/2014/main" xmlns="" id="{2B3BC7D9-408D-70DD-C133-F3754E102C5E}"/>
               </a:ext>
             </a:extLst>
           </p:cNvPr>
@@ -1821,7 +1826,7 @@
           <p:cNvPr id="8" name="頁尾版面配置區 7">
             <a:extLst>
               <a:ext uri="{FF2B5EF4-FFF2-40B4-BE49-F238E27FC236}">
-                <a16:creationId xmlns:a16="http://schemas.microsoft.com/office/drawing/2014/main" id="{EC8C2303-BB9E-F157-A940-318430501982}"/>
+                <a16:creationId xmlns:a16="http://schemas.microsoft.com/office/drawing/2014/main" xmlns="" id="{EC8C2303-BB9E-F157-A940-318430501982}"/>
               </a:ext>
             </a:extLst>
           </p:cNvPr>
@@ -1846,7 +1851,7 @@
           <p:cNvPr id="9" name="投影片編號版面配置區 8">
             <a:extLst>
               <a:ext uri="{FF2B5EF4-FFF2-40B4-BE49-F238E27FC236}">
-                <a16:creationId xmlns:a16="http://schemas.microsoft.com/office/drawing/2014/main" id="{0B410D5B-5370-323E-D3A4-FE379BA1EBEE}"/>
+                <a16:creationId xmlns:a16="http://schemas.microsoft.com/office/drawing/2014/main" xmlns="" id="{0B410D5B-5370-323E-D3A4-FE379BA1EBEE}"/>
               </a:ext>
             </a:extLst>
           </p:cNvPr>
@@ -1905,7 +1910,7 @@
           <p:cNvPr id="2" name="標題 1">
             <a:extLst>
               <a:ext uri="{FF2B5EF4-FFF2-40B4-BE49-F238E27FC236}">
-                <a16:creationId xmlns:a16="http://schemas.microsoft.com/office/drawing/2014/main" id="{DCF0AC98-4FDA-D49A-2E80-E1DB61835AAE}"/>
+                <a16:creationId xmlns:a16="http://schemas.microsoft.com/office/drawing/2014/main" xmlns="" id="{DCF0AC98-4FDA-D49A-2E80-E1DB61835AAE}"/>
               </a:ext>
             </a:extLst>
           </p:cNvPr>
@@ -1933,7 +1938,7 @@
           <p:cNvPr id="3" name="日期版面配置區 2">
             <a:extLst>
               <a:ext uri="{FF2B5EF4-FFF2-40B4-BE49-F238E27FC236}">
-                <a16:creationId xmlns:a16="http://schemas.microsoft.com/office/drawing/2014/main" id="{EFB41056-BEC7-F6BD-81D8-1C55911BD648}"/>
+                <a16:creationId xmlns:a16="http://schemas.microsoft.com/office/drawing/2014/main" xmlns="" id="{EFB41056-BEC7-F6BD-81D8-1C55911BD648}"/>
               </a:ext>
             </a:extLst>
           </p:cNvPr>
@@ -1962,7 +1967,7 @@
           <p:cNvPr id="4" name="頁尾版面配置區 3">
             <a:extLst>
               <a:ext uri="{FF2B5EF4-FFF2-40B4-BE49-F238E27FC236}">
-                <a16:creationId xmlns:a16="http://schemas.microsoft.com/office/drawing/2014/main" id="{71A24336-39C7-69C1-C9E7-A91DEC5616DA}"/>
+                <a16:creationId xmlns:a16="http://schemas.microsoft.com/office/drawing/2014/main" xmlns="" id="{71A24336-39C7-69C1-C9E7-A91DEC5616DA}"/>
               </a:ext>
             </a:extLst>
           </p:cNvPr>
@@ -1987,7 +1992,7 @@
           <p:cNvPr id="5" name="投影片編號版面配置區 4">
             <a:extLst>
               <a:ext uri="{FF2B5EF4-FFF2-40B4-BE49-F238E27FC236}">
-                <a16:creationId xmlns:a16="http://schemas.microsoft.com/office/drawing/2014/main" id="{72700098-F190-A9DE-4116-7880AD213AA4}"/>
+                <a16:creationId xmlns:a16="http://schemas.microsoft.com/office/drawing/2014/main" xmlns="" id="{72700098-F190-A9DE-4116-7880AD213AA4}"/>
               </a:ext>
             </a:extLst>
           </p:cNvPr>
@@ -2046,7 +2051,7 @@
           <p:cNvPr id="2" name="日期版面配置區 1">
             <a:extLst>
               <a:ext uri="{FF2B5EF4-FFF2-40B4-BE49-F238E27FC236}">
-                <a16:creationId xmlns:a16="http://schemas.microsoft.com/office/drawing/2014/main" id="{13DBB7CF-41FC-45F5-E5FA-A097FD42A9AB}"/>
+                <a16:creationId xmlns:a16="http://schemas.microsoft.com/office/drawing/2014/main" xmlns="" id="{13DBB7CF-41FC-45F5-E5FA-A097FD42A9AB}"/>
               </a:ext>
             </a:extLst>
           </p:cNvPr>
@@ -2075,7 +2080,7 @@
           <p:cNvPr id="3" name="頁尾版面配置區 2">
             <a:extLst>
               <a:ext uri="{FF2B5EF4-FFF2-40B4-BE49-F238E27FC236}">
-                <a16:creationId xmlns:a16="http://schemas.microsoft.com/office/drawing/2014/main" id="{8CA5B363-2150-699C-7EF3-0AA43380251E}"/>
+                <a16:creationId xmlns:a16="http://schemas.microsoft.com/office/drawing/2014/main" xmlns="" id="{8CA5B363-2150-699C-7EF3-0AA43380251E}"/>
               </a:ext>
             </a:extLst>
           </p:cNvPr>
@@ -2100,7 +2105,7 @@
           <p:cNvPr id="4" name="投影片編號版面配置區 3">
             <a:extLst>
               <a:ext uri="{FF2B5EF4-FFF2-40B4-BE49-F238E27FC236}">
-                <a16:creationId xmlns:a16="http://schemas.microsoft.com/office/drawing/2014/main" id="{3CC164A4-BE27-731D-49F0-2C7795FBB34B}"/>
+                <a16:creationId xmlns:a16="http://schemas.microsoft.com/office/drawing/2014/main" xmlns="" id="{3CC164A4-BE27-731D-49F0-2C7795FBB34B}"/>
               </a:ext>
             </a:extLst>
           </p:cNvPr>
@@ -2159,7 +2164,7 @@
           <p:cNvPr id="2" name="標題 1">
             <a:extLst>
               <a:ext uri="{FF2B5EF4-FFF2-40B4-BE49-F238E27FC236}">
-                <a16:creationId xmlns:a16="http://schemas.microsoft.com/office/drawing/2014/main" id="{1B847C90-E141-6131-3241-E731103219F7}"/>
+                <a16:creationId xmlns:a16="http://schemas.microsoft.com/office/drawing/2014/main" xmlns="" id="{1B847C90-E141-6131-3241-E731103219F7}"/>
               </a:ext>
             </a:extLst>
           </p:cNvPr>
@@ -2196,7 +2201,7 @@
           <p:cNvPr id="3" name="內容版面配置區 2">
             <a:extLst>
               <a:ext uri="{FF2B5EF4-FFF2-40B4-BE49-F238E27FC236}">
-                <a16:creationId xmlns:a16="http://schemas.microsoft.com/office/drawing/2014/main" id="{63F5A437-3786-17F9-879C-3E1C692B2E3C}"/>
+                <a16:creationId xmlns:a16="http://schemas.microsoft.com/office/drawing/2014/main" xmlns="" id="{63F5A437-3786-17F9-879C-3E1C692B2E3C}"/>
               </a:ext>
             </a:extLst>
           </p:cNvPr>
@@ -2286,7 +2291,7 @@
           <p:cNvPr id="4" name="文字版面配置區 3">
             <a:extLst>
               <a:ext uri="{FF2B5EF4-FFF2-40B4-BE49-F238E27FC236}">
-                <a16:creationId xmlns:a16="http://schemas.microsoft.com/office/drawing/2014/main" id="{3CA7EA22-CD86-B669-4D38-09E0993229C4}"/>
+                <a16:creationId xmlns:a16="http://schemas.microsoft.com/office/drawing/2014/main" xmlns="" id="{3CA7EA22-CD86-B669-4D38-09E0993229C4}"/>
               </a:ext>
             </a:extLst>
           </p:cNvPr>
@@ -2357,7 +2362,7 @@
           <p:cNvPr id="5" name="日期版面配置區 4">
             <a:extLst>
               <a:ext uri="{FF2B5EF4-FFF2-40B4-BE49-F238E27FC236}">
-                <a16:creationId xmlns:a16="http://schemas.microsoft.com/office/drawing/2014/main" id="{F555D279-52A6-FDEE-AE93-7ED1B0D2B8A6}"/>
+                <a16:creationId xmlns:a16="http://schemas.microsoft.com/office/drawing/2014/main" xmlns="" id="{F555D279-52A6-FDEE-AE93-7ED1B0D2B8A6}"/>
               </a:ext>
             </a:extLst>
           </p:cNvPr>
@@ -2386,7 +2391,7 @@
           <p:cNvPr id="6" name="頁尾版面配置區 5">
             <a:extLst>
               <a:ext uri="{FF2B5EF4-FFF2-40B4-BE49-F238E27FC236}">
-                <a16:creationId xmlns:a16="http://schemas.microsoft.com/office/drawing/2014/main" id="{805D84B4-DBF5-1498-01E8-539D12C28E4D}"/>
+                <a16:creationId xmlns:a16="http://schemas.microsoft.com/office/drawing/2014/main" xmlns="" id="{805D84B4-DBF5-1498-01E8-539D12C28E4D}"/>
               </a:ext>
             </a:extLst>
           </p:cNvPr>
@@ -2411,7 +2416,7 @@
           <p:cNvPr id="7" name="投影片編號版面配置區 6">
             <a:extLst>
               <a:ext uri="{FF2B5EF4-FFF2-40B4-BE49-F238E27FC236}">
-                <a16:creationId xmlns:a16="http://schemas.microsoft.com/office/drawing/2014/main" id="{6F6AA73C-7344-0D6C-FFA8-5A8FF8F60939}"/>
+                <a16:creationId xmlns:a16="http://schemas.microsoft.com/office/drawing/2014/main" xmlns="" id="{6F6AA73C-7344-0D6C-FFA8-5A8FF8F60939}"/>
               </a:ext>
             </a:extLst>
           </p:cNvPr>
@@ -2470,7 +2475,7 @@
           <p:cNvPr id="2" name="標題 1">
             <a:extLst>
               <a:ext uri="{FF2B5EF4-FFF2-40B4-BE49-F238E27FC236}">
-                <a16:creationId xmlns:a16="http://schemas.microsoft.com/office/drawing/2014/main" id="{46BBC364-A517-59C0-19BD-CE3E688C123B}"/>
+                <a16:creationId xmlns:a16="http://schemas.microsoft.com/office/drawing/2014/main" xmlns="" id="{46BBC364-A517-59C0-19BD-CE3E688C123B}"/>
               </a:ext>
             </a:extLst>
           </p:cNvPr>
@@ -2507,7 +2512,7 @@
           <p:cNvPr id="3" name="圖片版面配置區 2">
             <a:extLst>
               <a:ext uri="{FF2B5EF4-FFF2-40B4-BE49-F238E27FC236}">
-                <a16:creationId xmlns:a16="http://schemas.microsoft.com/office/drawing/2014/main" id="{5A499AC3-FD31-06F1-8B43-376BA44BE8AD}"/>
+                <a16:creationId xmlns:a16="http://schemas.microsoft.com/office/drawing/2014/main" xmlns="" id="{5A499AC3-FD31-06F1-8B43-376BA44BE8AD}"/>
               </a:ext>
             </a:extLst>
           </p:cNvPr>
@@ -2574,7 +2579,7 @@
           <p:cNvPr id="4" name="文字版面配置區 3">
             <a:extLst>
               <a:ext uri="{FF2B5EF4-FFF2-40B4-BE49-F238E27FC236}">
-                <a16:creationId xmlns:a16="http://schemas.microsoft.com/office/drawing/2014/main" id="{0F82DA9D-E704-B9DD-A419-0A3AAC82CDC9}"/>
+                <a16:creationId xmlns:a16="http://schemas.microsoft.com/office/drawing/2014/main" xmlns="" id="{0F82DA9D-E704-B9DD-A419-0A3AAC82CDC9}"/>
               </a:ext>
             </a:extLst>
           </p:cNvPr>
@@ -2645,7 +2650,7 @@
           <p:cNvPr id="5" name="日期版面配置區 4">
             <a:extLst>
               <a:ext uri="{FF2B5EF4-FFF2-40B4-BE49-F238E27FC236}">
-                <a16:creationId xmlns:a16="http://schemas.microsoft.com/office/drawing/2014/main" id="{47368963-AF3F-86D0-540A-69DA42D96E71}"/>
+                <a16:creationId xmlns:a16="http://schemas.microsoft.com/office/drawing/2014/main" xmlns="" id="{47368963-AF3F-86D0-540A-69DA42D96E71}"/>
               </a:ext>
             </a:extLst>
           </p:cNvPr>
@@ -2674,7 +2679,7 @@
           <p:cNvPr id="6" name="頁尾版面配置區 5">
             <a:extLst>
               <a:ext uri="{FF2B5EF4-FFF2-40B4-BE49-F238E27FC236}">
-                <a16:creationId xmlns:a16="http://schemas.microsoft.com/office/drawing/2014/main" id="{79FEE4FB-7E6A-F573-5B94-0CD8573ACEFF}"/>
+                <a16:creationId xmlns:a16="http://schemas.microsoft.com/office/drawing/2014/main" xmlns="" id="{79FEE4FB-7E6A-F573-5B94-0CD8573ACEFF}"/>
               </a:ext>
             </a:extLst>
           </p:cNvPr>
@@ -2699,7 +2704,7 @@
           <p:cNvPr id="7" name="投影片編號版面配置區 6">
             <a:extLst>
               <a:ext uri="{FF2B5EF4-FFF2-40B4-BE49-F238E27FC236}">
-                <a16:creationId xmlns:a16="http://schemas.microsoft.com/office/drawing/2014/main" id="{907F8059-6E19-7934-43C2-418C9EC9F856}"/>
+                <a16:creationId xmlns:a16="http://schemas.microsoft.com/office/drawing/2014/main" xmlns="" id="{907F8059-6E19-7934-43C2-418C9EC9F856}"/>
               </a:ext>
             </a:extLst>
           </p:cNvPr>
@@ -2763,7 +2768,7 @@
           <p:cNvPr id="2" name="標題版面配置區 1">
             <a:extLst>
               <a:ext uri="{FF2B5EF4-FFF2-40B4-BE49-F238E27FC236}">
-                <a16:creationId xmlns:a16="http://schemas.microsoft.com/office/drawing/2014/main" id="{7DB1FE6C-B152-C51B-36FA-FB3EF679C7B2}"/>
+                <a16:creationId xmlns:a16="http://schemas.microsoft.com/office/drawing/2014/main" xmlns="" id="{7DB1FE6C-B152-C51B-36FA-FB3EF679C7B2}"/>
               </a:ext>
             </a:extLst>
           </p:cNvPr>
@@ -2801,7 +2806,7 @@
           <p:cNvPr id="3" name="文字版面配置區 2">
             <a:extLst>
               <a:ext uri="{FF2B5EF4-FFF2-40B4-BE49-F238E27FC236}">
-                <a16:creationId xmlns:a16="http://schemas.microsoft.com/office/drawing/2014/main" id="{1387E42F-5D7E-99BC-67A4-0BDB37F60BC8}"/>
+                <a16:creationId xmlns:a16="http://schemas.microsoft.com/office/drawing/2014/main" xmlns="" id="{1387E42F-5D7E-99BC-67A4-0BDB37F60BC8}"/>
               </a:ext>
             </a:extLst>
           </p:cNvPr>
@@ -2868,7 +2873,7 @@
           <p:cNvPr id="4" name="日期版面配置區 3">
             <a:extLst>
               <a:ext uri="{FF2B5EF4-FFF2-40B4-BE49-F238E27FC236}">
-                <a16:creationId xmlns:a16="http://schemas.microsoft.com/office/drawing/2014/main" id="{C552AE79-B54F-5F5E-12AA-73C5B4AABE35}"/>
+                <a16:creationId xmlns:a16="http://schemas.microsoft.com/office/drawing/2014/main" xmlns="" id="{C552AE79-B54F-5F5E-12AA-73C5B4AABE35}"/>
               </a:ext>
             </a:extLst>
           </p:cNvPr>
@@ -2915,7 +2920,7 @@
           <p:cNvPr id="5" name="頁尾版面配置區 4">
             <a:extLst>
               <a:ext uri="{FF2B5EF4-FFF2-40B4-BE49-F238E27FC236}">
-                <a16:creationId xmlns:a16="http://schemas.microsoft.com/office/drawing/2014/main" id="{BC1FEB26-2377-3F7E-94D5-4273E2A1A579}"/>
+                <a16:creationId xmlns:a16="http://schemas.microsoft.com/office/drawing/2014/main" xmlns="" id="{BC1FEB26-2377-3F7E-94D5-4273E2A1A579}"/>
               </a:ext>
             </a:extLst>
           </p:cNvPr>
@@ -2958,7 +2963,7 @@
           <p:cNvPr id="6" name="投影片編號版面配置區 5">
             <a:extLst>
               <a:ext uri="{FF2B5EF4-FFF2-40B4-BE49-F238E27FC236}">
-                <a16:creationId xmlns:a16="http://schemas.microsoft.com/office/drawing/2014/main" id="{CD423C34-1AD1-99E8-84CD-2525DEC50BE7}"/>
+                <a16:creationId xmlns:a16="http://schemas.microsoft.com/office/drawing/2014/main" xmlns="" id="{CD423C34-1AD1-99E8-84CD-2525DEC50BE7}"/>
               </a:ext>
             </a:extLst>
           </p:cNvPr>
@@ -3326,7 +3331,7 @@
           <p:cNvPr id="4" name="文字方塊 3">
             <a:extLst>
               <a:ext uri="{FF2B5EF4-FFF2-40B4-BE49-F238E27FC236}">
-                <a16:creationId xmlns:a16="http://schemas.microsoft.com/office/drawing/2014/main" id="{5C8B1FB0-B29B-D491-6ACD-E4C6D048D3F9}"/>
+                <a16:creationId xmlns:a16="http://schemas.microsoft.com/office/drawing/2014/main" xmlns="" id="{5C8B1FB0-B29B-D491-6ACD-E4C6D048D3F9}"/>
               </a:ext>
             </a:extLst>
           </p:cNvPr>
@@ -3335,7 +3340,7 @@
         </p:nvSpPr>
         <p:spPr>
           <a:xfrm>
-            <a:off x="801666" y="1540701"/>
+            <a:off x="501246" y="1427532"/>
             <a:ext cx="2027799" cy="369332"/>
           </a:xfrm>
           <a:prstGeom prst="rect">
@@ -3362,7 +3367,7 @@
           <p:cNvPr id="5" name="文字方塊 4">
             <a:extLst>
               <a:ext uri="{FF2B5EF4-FFF2-40B4-BE49-F238E27FC236}">
-                <a16:creationId xmlns:a16="http://schemas.microsoft.com/office/drawing/2014/main" id="{C5849FED-D33C-F936-A16C-F3E5D675F9FC}"/>
+                <a16:creationId xmlns:a16="http://schemas.microsoft.com/office/drawing/2014/main" xmlns="" id="{C5849FED-D33C-F936-A16C-F3E5D675F9FC}"/>
               </a:ext>
             </a:extLst>
           </p:cNvPr>
@@ -3400,7 +3405,7 @@
           <p:cNvPr id="6" name="文字方塊 5">
             <a:extLst>
               <a:ext uri="{FF2B5EF4-FFF2-40B4-BE49-F238E27FC236}">
-                <a16:creationId xmlns:a16="http://schemas.microsoft.com/office/drawing/2014/main" id="{245F3B52-FFF4-331C-B246-ABA6A402576B}"/>
+                <a16:creationId xmlns:a16="http://schemas.microsoft.com/office/drawing/2014/main" xmlns="" id="{245F3B52-FFF4-331C-B246-ABA6A402576B}"/>
               </a:ext>
             </a:extLst>
           </p:cNvPr>
@@ -3409,7 +3414,7 @@
         </p:nvSpPr>
         <p:spPr>
           <a:xfrm>
-            <a:off x="3260993" y="1540701"/>
+            <a:off x="2677870" y="1119422"/>
             <a:ext cx="3592458" cy="369332"/>
           </a:xfrm>
           <a:prstGeom prst="rect">
@@ -3436,7 +3441,7 @@
           <p:cNvPr id="9" name="文字方塊 8">
             <a:extLst>
               <a:ext uri="{FF2B5EF4-FFF2-40B4-BE49-F238E27FC236}">
-                <a16:creationId xmlns:a16="http://schemas.microsoft.com/office/drawing/2014/main" id="{A5A147DA-F112-E8F2-26E9-9F046055CCB0}"/>
+                <a16:creationId xmlns:a16="http://schemas.microsoft.com/office/drawing/2014/main" xmlns="" id="{A5A147DA-F112-E8F2-26E9-9F046055CCB0}"/>
               </a:ext>
             </a:extLst>
           </p:cNvPr>
@@ -3474,7 +3479,7 @@
           <p:cNvPr id="10" name="文字方塊 9">
             <a:extLst>
               <a:ext uri="{FF2B5EF4-FFF2-40B4-BE49-F238E27FC236}">
-                <a16:creationId xmlns:a16="http://schemas.microsoft.com/office/drawing/2014/main" id="{0FDED54E-7F9B-27A1-13F3-5C9AF0422113}"/>
+                <a16:creationId xmlns:a16="http://schemas.microsoft.com/office/drawing/2014/main" xmlns="" id="{0FDED54E-7F9B-27A1-13F3-5C9AF0422113}"/>
               </a:ext>
             </a:extLst>
           </p:cNvPr>
@@ -3512,7 +3517,7 @@
           <p:cNvPr id="11" name="文字方塊 10">
             <a:extLst>
               <a:ext uri="{FF2B5EF4-FFF2-40B4-BE49-F238E27FC236}">
-                <a16:creationId xmlns:a16="http://schemas.microsoft.com/office/drawing/2014/main" id="{A39F9A72-8349-E30E-D4D7-F0C9BCB4504D}"/>
+                <a16:creationId xmlns:a16="http://schemas.microsoft.com/office/drawing/2014/main" xmlns="" id="{A39F9A72-8349-E30E-D4D7-F0C9BCB4504D}"/>
               </a:ext>
             </a:extLst>
           </p:cNvPr>
@@ -3550,7 +3555,7 @@
           <p:cNvPr id="13" name="文字方塊 12">
             <a:extLst>
               <a:ext uri="{FF2B5EF4-FFF2-40B4-BE49-F238E27FC236}">
-                <a16:creationId xmlns:a16="http://schemas.microsoft.com/office/drawing/2014/main" id="{645E7E05-9A8F-9E08-997C-3688CD23C81B}"/>
+                <a16:creationId xmlns:a16="http://schemas.microsoft.com/office/drawing/2014/main" xmlns="" id="{645E7E05-9A8F-9E08-997C-3688CD23C81B}"/>
               </a:ext>
             </a:extLst>
           </p:cNvPr>
@@ -3588,7 +3593,7 @@
           <p:cNvPr id="14" name="文字方塊 13">
             <a:extLst>
               <a:ext uri="{FF2B5EF4-FFF2-40B4-BE49-F238E27FC236}">
-                <a16:creationId xmlns:a16="http://schemas.microsoft.com/office/drawing/2014/main" id="{8E35995B-6845-0B49-91FA-06DDC5CF44FA}"/>
+                <a16:creationId xmlns:a16="http://schemas.microsoft.com/office/drawing/2014/main" xmlns="" id="{8E35995B-6845-0B49-91FA-06DDC5CF44FA}"/>
               </a:ext>
             </a:extLst>
           </p:cNvPr>
@@ -3597,7 +3602,7 @@
         </p:nvSpPr>
         <p:spPr>
           <a:xfrm>
-            <a:off x="7300287" y="1540701"/>
+            <a:off x="7441458" y="1397190"/>
             <a:ext cx="4750542" cy="646331"/>
           </a:xfrm>
           <a:prstGeom prst="rect">
@@ -3650,7 +3655,7 @@
           <p:cNvPr id="15" name="文字方塊 14">
             <a:extLst>
               <a:ext uri="{FF2B5EF4-FFF2-40B4-BE49-F238E27FC236}">
-                <a16:creationId xmlns:a16="http://schemas.microsoft.com/office/drawing/2014/main" id="{BFCE80E3-677A-E71B-D146-B2A09EF5E7F3}"/>
+                <a16:creationId xmlns:a16="http://schemas.microsoft.com/office/drawing/2014/main" xmlns="" id="{BFCE80E3-677A-E71B-D146-B2A09EF5E7F3}"/>
               </a:ext>
             </a:extLst>
           </p:cNvPr>
@@ -3686,7 +3691,7 @@
           <p:cNvPr id="16" name="文字方塊 15">
             <a:extLst>
               <a:ext uri="{FF2B5EF4-FFF2-40B4-BE49-F238E27FC236}">
-                <a16:creationId xmlns:a16="http://schemas.microsoft.com/office/drawing/2014/main" id="{B9277DDE-8341-FCCD-6154-031232D8995A}"/>
+                <a16:creationId xmlns:a16="http://schemas.microsoft.com/office/drawing/2014/main" xmlns="" id="{B9277DDE-8341-FCCD-6154-031232D8995A}"/>
               </a:ext>
             </a:extLst>
           </p:cNvPr>
@@ -3722,7 +3727,7 @@
           <p:cNvPr id="17" name="文字方塊 16">
             <a:extLst>
               <a:ext uri="{FF2B5EF4-FFF2-40B4-BE49-F238E27FC236}">
-                <a16:creationId xmlns:a16="http://schemas.microsoft.com/office/drawing/2014/main" id="{A7C25557-CED4-AA68-5374-0E0406D5D289}"/>
+                <a16:creationId xmlns:a16="http://schemas.microsoft.com/office/drawing/2014/main" xmlns="" id="{A7C25557-CED4-AA68-5374-0E0406D5D289}"/>
               </a:ext>
             </a:extLst>
           </p:cNvPr>
@@ -3758,7 +3763,7 @@
           <p:cNvPr id="18" name="文字方塊 17">
             <a:extLst>
               <a:ext uri="{FF2B5EF4-FFF2-40B4-BE49-F238E27FC236}">
-                <a16:creationId xmlns:a16="http://schemas.microsoft.com/office/drawing/2014/main" id="{B7D7681D-2021-56CC-ED02-FFD8CFFF2D28}"/>
+                <a16:creationId xmlns:a16="http://schemas.microsoft.com/office/drawing/2014/main" xmlns="" id="{B7D7681D-2021-56CC-ED02-FFD8CFFF2D28}"/>
               </a:ext>
             </a:extLst>
           </p:cNvPr>

</xml_diff>